<commit_message>
The presentation on Monday
</commit_message>
<xml_diff>
--- a/Project3/Reports/P3 imterim presentation.pptx
+++ b/Project3/Reports/P3 imterim presentation.pptx
@@ -9,6 +9,8 @@
     <p:sldId id="258" r:id="rId3"/>
     <p:sldId id="259" r:id="rId4"/>
     <p:sldId id="260" r:id="rId5"/>
+    <p:sldId id="261" r:id="rId6"/>
+    <p:sldId id="262" r:id="rId7"/>
   </p:sldIdLst>
   <p:sldSz cx="12192000" cy="6858000"/>
   <p:notesSz cx="6858000" cy="9144000"/>
@@ -107,6 +109,11 @@
       </a:defRPr>
     </a:lvl9pPr>
   </p:defaultTextStyle>
+  <p:extLst>
+    <p:ext uri="{EFAFB233-063F-42B5-8137-9DF3F51BA10A}">
+      <p15:sldGuideLst xmlns:p15="http://schemas.microsoft.com/office/powerpoint/2012/main"/>
+    </p:ext>
+  </p:extLst>
 </p:presentation>
 </file>
 
@@ -241,7 +248,7 @@
           <a:p>
             <a:fld id="{388D2EDD-F0B6-4CAF-9088-7B252093240B}" type="datetimeFigureOut">
               <a:rPr lang="en-US" smtClean="0"/>
-              <a:t>11/11/2018</a:t>
+              <a:t>11/13/2018</a:t>
             </a:fld>
             <a:endParaRPr lang="en-US"/>
           </a:p>
@@ -411,7 +418,7 @@
           <a:p>
             <a:fld id="{388D2EDD-F0B6-4CAF-9088-7B252093240B}" type="datetimeFigureOut">
               <a:rPr lang="en-US" smtClean="0"/>
-              <a:t>11/11/2018</a:t>
+              <a:t>11/13/2018</a:t>
             </a:fld>
             <a:endParaRPr lang="en-US"/>
           </a:p>
@@ -591,7 +598,7 @@
           <a:p>
             <a:fld id="{388D2EDD-F0B6-4CAF-9088-7B252093240B}" type="datetimeFigureOut">
               <a:rPr lang="en-US" smtClean="0"/>
-              <a:t>11/11/2018</a:t>
+              <a:t>11/13/2018</a:t>
             </a:fld>
             <a:endParaRPr lang="en-US"/>
           </a:p>
@@ -761,7 +768,7 @@
           <a:p>
             <a:fld id="{388D2EDD-F0B6-4CAF-9088-7B252093240B}" type="datetimeFigureOut">
               <a:rPr lang="en-US" smtClean="0"/>
-              <a:t>11/11/2018</a:t>
+              <a:t>11/13/2018</a:t>
             </a:fld>
             <a:endParaRPr lang="en-US"/>
           </a:p>
@@ -1007,7 +1014,7 @@
           <a:p>
             <a:fld id="{388D2EDD-F0B6-4CAF-9088-7B252093240B}" type="datetimeFigureOut">
               <a:rPr lang="en-US" smtClean="0"/>
-              <a:t>11/11/2018</a:t>
+              <a:t>11/13/2018</a:t>
             </a:fld>
             <a:endParaRPr lang="en-US"/>
           </a:p>
@@ -1239,7 +1246,7 @@
           <a:p>
             <a:fld id="{388D2EDD-F0B6-4CAF-9088-7B252093240B}" type="datetimeFigureOut">
               <a:rPr lang="en-US" smtClean="0"/>
-              <a:t>11/11/2018</a:t>
+              <a:t>11/13/2018</a:t>
             </a:fld>
             <a:endParaRPr lang="en-US"/>
           </a:p>
@@ -1606,7 +1613,7 @@
           <a:p>
             <a:fld id="{388D2EDD-F0B6-4CAF-9088-7B252093240B}" type="datetimeFigureOut">
               <a:rPr lang="en-US" smtClean="0"/>
-              <a:t>11/11/2018</a:t>
+              <a:t>11/13/2018</a:t>
             </a:fld>
             <a:endParaRPr lang="en-US"/>
           </a:p>
@@ -1724,7 +1731,7 @@
           <a:p>
             <a:fld id="{388D2EDD-F0B6-4CAF-9088-7B252093240B}" type="datetimeFigureOut">
               <a:rPr lang="en-US" smtClean="0"/>
-              <a:t>11/11/2018</a:t>
+              <a:t>11/13/2018</a:t>
             </a:fld>
             <a:endParaRPr lang="en-US"/>
           </a:p>
@@ -1819,7 +1826,7 @@
           <a:p>
             <a:fld id="{388D2EDD-F0B6-4CAF-9088-7B252093240B}" type="datetimeFigureOut">
               <a:rPr lang="en-US" smtClean="0"/>
-              <a:t>11/11/2018</a:t>
+              <a:t>11/13/2018</a:t>
             </a:fld>
             <a:endParaRPr lang="en-US"/>
           </a:p>
@@ -2096,7 +2103,7 @@
           <a:p>
             <a:fld id="{388D2EDD-F0B6-4CAF-9088-7B252093240B}" type="datetimeFigureOut">
               <a:rPr lang="en-US" smtClean="0"/>
-              <a:t>11/11/2018</a:t>
+              <a:t>11/13/2018</a:t>
             </a:fld>
             <a:endParaRPr lang="en-US"/>
           </a:p>
@@ -2349,7 +2356,7 @@
           <a:p>
             <a:fld id="{388D2EDD-F0B6-4CAF-9088-7B252093240B}" type="datetimeFigureOut">
               <a:rPr lang="en-US" smtClean="0"/>
-              <a:t>11/11/2018</a:t>
+              <a:t>11/13/2018</a:t>
             </a:fld>
             <a:endParaRPr lang="en-US"/>
           </a:p>
@@ -2562,7 +2569,7 @@
           <a:p>
             <a:fld id="{388D2EDD-F0B6-4CAF-9088-7B252093240B}" type="datetimeFigureOut">
               <a:rPr lang="en-US" smtClean="0"/>
-              <a:t>11/11/2018</a:t>
+              <a:t>11/13/2018</a:t>
             </a:fld>
             <a:endParaRPr lang="en-US"/>
           </a:p>
@@ -3025,11 +3032,7 @@
           <a:p>
             <a:r>
               <a:rPr lang="en-US" dirty="0" smtClean="0"/>
-              <a:t>The change of </a:t>
-            </a:r>
-            <a:r>
-              <a:rPr lang="en-US" dirty="0" smtClean="0"/>
-              <a:t>heart surgeries Mortality Rate from 1980-1982</a:t>
+              <a:t>The change of heart surgeries Mortality Rate from 1980-1982</a:t>
             </a:r>
           </a:p>
           <a:p>
@@ -3223,7 +3226,6 @@
               <a:rPr lang="en-US" sz="1400" dirty="0" smtClean="0"/>
               <a:t>Visualize deaths rate, expected death rate, trends</a:t>
             </a:r>
-            <a:endParaRPr lang="en-US" sz="1400" dirty="0" smtClean="0"/>
           </a:p>
           <a:p>
             <a:pPr lvl="1"/>
@@ -5542,8 +5544,8 @@
           </a:p>
         </p:txBody>
       </p:sp>
-      <mc:AlternateContent xmlns:mc="http://schemas.openxmlformats.org/markup-compatibility/2006">
-        <mc:Choice xmlns:a14="http://schemas.microsoft.com/office/drawing/2010/main" Requires="a14">
+      <mc:AlternateContent xmlns:mc="http://schemas.openxmlformats.org/markup-compatibility/2006" xmlns:a14="http://schemas.microsoft.com/office/drawing/2010/main">
+        <mc:Choice Requires="a14">
           <p:sp>
             <p:nvSpPr>
               <p:cNvPr id="8" name="Rectangle 7"/>
@@ -6200,7 +6202,7 @@
             </p:txBody>
           </p:sp>
         </mc:Choice>
-        <mc:Fallback>
+        <mc:Fallback xmlns="">
           <p:sp>
             <p:nvSpPr>
               <p:cNvPr id="8" name="Rectangle 7"/>
@@ -6243,6 +6245,228 @@
     <p:extLst>
       <p:ext uri="{BB962C8B-B14F-4D97-AF65-F5344CB8AC3E}">
         <p14:creationId xmlns:p14="http://schemas.microsoft.com/office/powerpoint/2010/main" val="1735951700"/>
+      </p:ext>
+    </p:extLst>
+  </p:cSld>
+  <p:clrMapOvr>
+    <a:masterClrMapping/>
+  </p:clrMapOvr>
+</p:sld>
+</file>
+
+<file path=ppt/slides/slide5.xml><?xml version="1.0" encoding="utf-8"?>
+<p:sld xmlns:a="http://schemas.openxmlformats.org/drawingml/2006/main" xmlns:r="http://schemas.openxmlformats.org/officeDocument/2006/relationships" xmlns:p="http://schemas.openxmlformats.org/presentationml/2006/main">
+  <p:cSld>
+    <p:spTree>
+      <p:nvGrpSpPr>
+        <p:cNvPr id="1" name=""/>
+        <p:cNvGrpSpPr/>
+        <p:nvPr/>
+      </p:nvGrpSpPr>
+      <p:grpSpPr>
+        <a:xfrm>
+          <a:off x="0" y="0"/>
+          <a:ext cx="0" cy="0"/>
+          <a:chOff x="0" y="0"/>
+          <a:chExt cx="0" cy="0"/>
+        </a:xfrm>
+      </p:grpSpPr>
+      <p:sp>
+        <p:nvSpPr>
+          <p:cNvPr id="2" name="Title 1"/>
+          <p:cNvSpPr>
+            <a:spLocks noGrp="1"/>
+          </p:cNvSpPr>
+          <p:nvPr>
+            <p:ph type="title"/>
+          </p:nvPr>
+        </p:nvSpPr>
+        <p:spPr/>
+        <p:txBody>
+          <a:bodyPr/>
+          <a:lstStyle/>
+          <a:p>
+            <a:endParaRPr lang="en-US"/>
+          </a:p>
+        </p:txBody>
+      </p:sp>
+      <p:sp>
+        <p:nvSpPr>
+          <p:cNvPr id="3" name="Content Placeholder 2"/>
+          <p:cNvSpPr>
+            <a:spLocks noGrp="1"/>
+          </p:cNvSpPr>
+          <p:nvPr>
+            <p:ph idx="1"/>
+          </p:nvPr>
+        </p:nvSpPr>
+        <p:spPr/>
+        <p:txBody>
+          <a:bodyPr>
+            <a:normAutofit fontScale="92500" lnSpcReduction="10000"/>
+          </a:bodyPr>
+          <a:lstStyle/>
+          <a:p>
+            <a:r>
+              <a:rPr lang="en-US" dirty="0" smtClean="0"/>
+              <a:t>Delete procedure=2 and missing</a:t>
+            </a:r>
+            <a:endParaRPr lang="en-US" dirty="0" smtClean="0"/>
+          </a:p>
+          <a:p>
+            <a:r>
+              <a:rPr lang="en-US" dirty="0" err="1" smtClean="0"/>
+              <a:t>ASA:Categorical</a:t>
+            </a:r>
+            <a:r>
+              <a:rPr lang="en-US" dirty="0" smtClean="0"/>
+              <a:t> or not?</a:t>
+            </a:r>
+          </a:p>
+          <a:p>
+            <a:r>
+              <a:rPr lang="en-US" dirty="0" smtClean="0"/>
+              <a:t>Check: periods#39, ASA distribution: most of them are in3,4 (88%)</a:t>
+            </a:r>
+          </a:p>
+          <a:p>
+            <a:r>
+              <a:rPr lang="en-US" dirty="0" smtClean="0"/>
+              <a:t>Albumin: missing a lot, delete</a:t>
+            </a:r>
+          </a:p>
+          <a:p>
+            <a:r>
+              <a:rPr lang="en-US" dirty="0" smtClean="0"/>
+              <a:t>BMI and weight height are highly correlated, we can only keep BMI.</a:t>
+            </a:r>
+          </a:p>
+          <a:p>
+            <a:endParaRPr lang="en-US" dirty="0" smtClean="0"/>
+          </a:p>
+          <a:p>
+            <a:r>
+              <a:rPr lang="en-US" dirty="0"/>
+              <a:t>Compare 34-38 and 39, two </a:t>
+            </a:r>
+            <a:r>
+              <a:rPr lang="en-US" dirty="0" smtClean="0"/>
+              <a:t>period</a:t>
+            </a:r>
+          </a:p>
+          <a:p>
+            <a:r>
+              <a:rPr lang="en-US" dirty="0" smtClean="0"/>
+              <a:t>Each hospital, plug the past model predictor, then analysis the #39</a:t>
+            </a:r>
+          </a:p>
+          <a:p>
+            <a:r>
+              <a:rPr lang="en-US" dirty="0" smtClean="0"/>
+              <a:t>Predicted death rate, expected death rate, plug in the regression model. </a:t>
+            </a:r>
+            <a:r>
+              <a:rPr lang="en-US" dirty="0" smtClean="0"/>
+              <a:t>Predict </a:t>
+            </a:r>
+            <a:r>
+              <a:rPr lang="en-US" dirty="0" smtClean="0"/>
+              <a:t>is different than expect</a:t>
+            </a:r>
+            <a:r>
+              <a:rPr lang="en-US" dirty="0" smtClean="0"/>
+              <a:t>.</a:t>
+            </a:r>
+            <a:endParaRPr lang="en-US" dirty="0" smtClean="0"/>
+          </a:p>
+        </p:txBody>
+      </p:sp>
+    </p:spTree>
+    <p:extLst>
+      <p:ext uri="{BB962C8B-B14F-4D97-AF65-F5344CB8AC3E}">
+        <p14:creationId xmlns:p14="http://schemas.microsoft.com/office/powerpoint/2010/main" val="1385386142"/>
+      </p:ext>
+    </p:extLst>
+  </p:cSld>
+  <p:clrMapOvr>
+    <a:masterClrMapping/>
+  </p:clrMapOvr>
+</p:sld>
+</file>
+
+<file path=ppt/slides/slide6.xml><?xml version="1.0" encoding="utf-8"?>
+<p:sld xmlns:a="http://schemas.openxmlformats.org/drawingml/2006/main" xmlns:r="http://schemas.openxmlformats.org/officeDocument/2006/relationships" xmlns:p="http://schemas.openxmlformats.org/presentationml/2006/main">
+  <p:cSld>
+    <p:spTree>
+      <p:nvGrpSpPr>
+        <p:cNvPr id="1" name=""/>
+        <p:cNvGrpSpPr/>
+        <p:nvPr/>
+      </p:nvGrpSpPr>
+      <p:grpSpPr>
+        <a:xfrm>
+          <a:off x="0" y="0"/>
+          <a:ext cx="0" cy="0"/>
+          <a:chOff x="0" y="0"/>
+          <a:chExt cx="0" cy="0"/>
+        </a:xfrm>
+      </p:grpSpPr>
+      <p:sp>
+        <p:nvSpPr>
+          <p:cNvPr id="2" name="Title 1"/>
+          <p:cNvSpPr>
+            <a:spLocks noGrp="1"/>
+          </p:cNvSpPr>
+          <p:nvPr>
+            <p:ph type="title"/>
+          </p:nvPr>
+        </p:nvSpPr>
+        <p:spPr/>
+        <p:txBody>
+          <a:bodyPr/>
+          <a:lstStyle/>
+          <a:p>
+            <a:r>
+              <a:rPr lang="en-US" dirty="0" smtClean="0"/>
+              <a:t>Analysis plan</a:t>
+            </a:r>
+            <a:endParaRPr lang="en-US" dirty="0"/>
+          </a:p>
+        </p:txBody>
+      </p:sp>
+      <p:sp>
+        <p:nvSpPr>
+          <p:cNvPr id="3" name="Content Placeholder 2"/>
+          <p:cNvSpPr>
+            <a:spLocks noGrp="1"/>
+          </p:cNvSpPr>
+          <p:nvPr>
+            <p:ph idx="1"/>
+          </p:nvPr>
+        </p:nvSpPr>
+        <p:spPr/>
+        <p:txBody>
+          <a:bodyPr/>
+          <a:lstStyle/>
+          <a:p>
+            <a:r>
+              <a:rPr lang="en-US" dirty="0" smtClean="0"/>
+              <a:t>Calculated the death rate for each hospital over 3 years</a:t>
+            </a:r>
+          </a:p>
+          <a:p>
+            <a:r>
+              <a:rPr lang="en-US" dirty="0" smtClean="0"/>
+              <a:t>Ignore hospital, fit a simple logistic regression using past 2.5 years</a:t>
+            </a:r>
+            <a:endParaRPr lang="en-US" dirty="0"/>
+          </a:p>
+        </p:txBody>
+      </p:sp>
+    </p:spTree>
+    <p:extLst>
+      <p:ext uri="{BB962C8B-B14F-4D97-AF65-F5344CB8AC3E}">
+        <p14:creationId xmlns:p14="http://schemas.microsoft.com/office/powerpoint/2010/main" val="2533155768"/>
       </p:ext>
     </p:extLst>
   </p:cSld>

</xml_diff>

<commit_message>
forget the presentation ppt
</commit_message>
<xml_diff>
--- a/Project3/Reports/P3 imterim presentation.pptx
+++ b/Project3/Reports/P3 imterim presentation.pptx
@@ -248,7 +248,7 @@
           <a:p>
             <a:fld id="{388D2EDD-F0B6-4CAF-9088-7B252093240B}" type="datetimeFigureOut">
               <a:rPr lang="en-US" smtClean="0"/>
-              <a:t>11/13/2018</a:t>
+              <a:t>11/20/2018</a:t>
             </a:fld>
             <a:endParaRPr lang="en-US"/>
           </a:p>
@@ -418,7 +418,7 @@
           <a:p>
             <a:fld id="{388D2EDD-F0B6-4CAF-9088-7B252093240B}" type="datetimeFigureOut">
               <a:rPr lang="en-US" smtClean="0"/>
-              <a:t>11/13/2018</a:t>
+              <a:t>11/20/2018</a:t>
             </a:fld>
             <a:endParaRPr lang="en-US"/>
           </a:p>
@@ -598,7 +598,7 @@
           <a:p>
             <a:fld id="{388D2EDD-F0B6-4CAF-9088-7B252093240B}" type="datetimeFigureOut">
               <a:rPr lang="en-US" smtClean="0"/>
-              <a:t>11/13/2018</a:t>
+              <a:t>11/20/2018</a:t>
             </a:fld>
             <a:endParaRPr lang="en-US"/>
           </a:p>
@@ -768,7 +768,7 @@
           <a:p>
             <a:fld id="{388D2EDD-F0B6-4CAF-9088-7B252093240B}" type="datetimeFigureOut">
               <a:rPr lang="en-US" smtClean="0"/>
-              <a:t>11/13/2018</a:t>
+              <a:t>11/20/2018</a:t>
             </a:fld>
             <a:endParaRPr lang="en-US"/>
           </a:p>
@@ -1014,7 +1014,7 @@
           <a:p>
             <a:fld id="{388D2EDD-F0B6-4CAF-9088-7B252093240B}" type="datetimeFigureOut">
               <a:rPr lang="en-US" smtClean="0"/>
-              <a:t>11/13/2018</a:t>
+              <a:t>11/20/2018</a:t>
             </a:fld>
             <a:endParaRPr lang="en-US"/>
           </a:p>
@@ -1246,7 +1246,7 @@
           <a:p>
             <a:fld id="{388D2EDD-F0B6-4CAF-9088-7B252093240B}" type="datetimeFigureOut">
               <a:rPr lang="en-US" smtClean="0"/>
-              <a:t>11/13/2018</a:t>
+              <a:t>11/20/2018</a:t>
             </a:fld>
             <a:endParaRPr lang="en-US"/>
           </a:p>
@@ -1613,7 +1613,7 @@
           <a:p>
             <a:fld id="{388D2EDD-F0B6-4CAF-9088-7B252093240B}" type="datetimeFigureOut">
               <a:rPr lang="en-US" smtClean="0"/>
-              <a:t>11/13/2018</a:t>
+              <a:t>11/20/2018</a:t>
             </a:fld>
             <a:endParaRPr lang="en-US"/>
           </a:p>
@@ -1731,7 +1731,7 @@
           <a:p>
             <a:fld id="{388D2EDD-F0B6-4CAF-9088-7B252093240B}" type="datetimeFigureOut">
               <a:rPr lang="en-US" smtClean="0"/>
-              <a:t>11/13/2018</a:t>
+              <a:t>11/20/2018</a:t>
             </a:fld>
             <a:endParaRPr lang="en-US"/>
           </a:p>
@@ -1826,7 +1826,7 @@
           <a:p>
             <a:fld id="{388D2EDD-F0B6-4CAF-9088-7B252093240B}" type="datetimeFigureOut">
               <a:rPr lang="en-US" smtClean="0"/>
-              <a:t>11/13/2018</a:t>
+              <a:t>11/20/2018</a:t>
             </a:fld>
             <a:endParaRPr lang="en-US"/>
           </a:p>
@@ -2103,7 +2103,7 @@
           <a:p>
             <a:fld id="{388D2EDD-F0B6-4CAF-9088-7B252093240B}" type="datetimeFigureOut">
               <a:rPr lang="en-US" smtClean="0"/>
-              <a:t>11/13/2018</a:t>
+              <a:t>11/20/2018</a:t>
             </a:fld>
             <a:endParaRPr lang="en-US"/>
           </a:p>
@@ -2356,7 +2356,7 @@
           <a:p>
             <a:fld id="{388D2EDD-F0B6-4CAF-9088-7B252093240B}" type="datetimeFigureOut">
               <a:rPr lang="en-US" smtClean="0"/>
-              <a:t>11/13/2018</a:t>
+              <a:t>11/20/2018</a:t>
             </a:fld>
             <a:endParaRPr lang="en-US"/>
           </a:p>
@@ -2569,7 +2569,7 @@
           <a:p>
             <a:fld id="{388D2EDD-F0B6-4CAF-9088-7B252093240B}" type="datetimeFigureOut">
               <a:rPr lang="en-US" smtClean="0"/>
-              <a:t>11/13/2018</a:t>
+              <a:t>11/20/2018</a:t>
             </a:fld>
             <a:endParaRPr lang="en-US"/>
           </a:p>
@@ -4277,13 +4277,22 @@
           <a:p>
             <a:r>
               <a:rPr lang="en-US" sz="1600" dirty="0" smtClean="0"/>
-              <a:t>No impossible values</a:t>
-            </a:r>
+              <a:t>3 </a:t>
+            </a:r>
+            <a:r>
+              <a:rPr lang="en-US" sz="1600" smtClean="0"/>
+              <a:t>BMI outlier</a:t>
+            </a:r>
+            <a:endParaRPr lang="en-US" sz="1600" smtClean="0"/>
           </a:p>
           <a:p>
             <a:r>
               <a:rPr lang="en-US" sz="1600" dirty="0" smtClean="0"/>
-              <a:t>Procedure=2, plan to delete</a:t>
+              <a:t>Procedure=2</a:t>
+            </a:r>
+            <a:r>
+              <a:rPr lang="en-US" sz="1600" dirty="0" smtClean="0"/>
+              <a:t>, plan to delete</a:t>
             </a:r>
           </a:p>
           <a:p>
@@ -6311,7 +6320,6 @@
               <a:rPr lang="en-US" dirty="0" smtClean="0"/>
               <a:t>Delete procedure=2 and missing</a:t>
             </a:r>
-            <a:endParaRPr lang="en-US" dirty="0" smtClean="0"/>
           </a:p>
           <a:p>
             <a:r>
@@ -6363,21 +6371,8 @@
           <a:p>
             <a:r>
               <a:rPr lang="en-US" dirty="0" smtClean="0"/>
-              <a:t>Predicted death rate, expected death rate, plug in the regression model. </a:t>
-            </a:r>
-            <a:r>
-              <a:rPr lang="en-US" dirty="0" smtClean="0"/>
-              <a:t>Predict </a:t>
-            </a:r>
-            <a:r>
-              <a:rPr lang="en-US" dirty="0" smtClean="0"/>
-              <a:t>is different than expect</a:t>
-            </a:r>
-            <a:r>
-              <a:rPr lang="en-US" dirty="0" smtClean="0"/>
-              <a:t>.</a:t>
-            </a:r>
-            <a:endParaRPr lang="en-US" dirty="0" smtClean="0"/>
+              <a:t>Predicted death rate, expected death rate, plug in the regression model. Predict is different than expect.</a:t>
+            </a:r>
           </a:p>
         </p:txBody>
       </p:sp>

</xml_diff>